<commit_message>
status report semana 2
</commit_message>
<xml_diff>
--- a/Documentos/ppt's/status-report-gotravel.pptx
+++ b/Documentos/ppt's/status-report-gotravel.pptx
@@ -593,7 +593,7 @@
             <a:fld id="{C3CD65D1-5C11-455D-9F9A-0E035F00A0DA}" type="datetimeFigureOut">
               <a:rPr lang="pt-BR" smtClean="0"/>
               <a:pPr/>
-              <a:t>28/09/2020</a:t>
+              <a:t>05/10/2020</a:t>
             </a:fld>
             <a:endParaRPr lang="pt-BR"/>
           </a:p>
@@ -761,7 +761,7 @@
             <a:fld id="{A05DA3EF-18EA-43DE-B1BB-402A3C558822}" type="datetimeFigureOut">
               <a:rPr lang="pt-BR" smtClean="0"/>
               <a:pPr/>
-              <a:t>28/09/2020</a:t>
+              <a:t>05/10/2020</a:t>
             </a:fld>
             <a:endParaRPr lang="pt-BR"/>
           </a:p>
@@ -3591,7 +3591,7 @@
           <a:graphicData uri="http://schemas.openxmlformats.org/presentationml/2006/ole">
             <mc:AlternateContent xmlns:mc="http://schemas.openxmlformats.org/markup-compatibility/2006">
               <mc:Choice xmlns:v="urn:schemas-microsoft-com:vml" Requires="v">
-                <p:oleObj spid="_x0000_s1044" name="Slide do think-cell" r:id="rId8" imgW="0" imgH="0" progId="TCLayout.ActiveDocument.1">
+                <p:oleObj spid="_x0000_s1046" name="Slide do think-cell" r:id="rId8" imgW="0" imgH="0" progId="TCLayout.ActiveDocument.1">
                   <p:embed/>
                 </p:oleObj>
               </mc:Choice>
@@ -24080,7 +24080,7 @@
           <p:cNvPr id="2" name="Espaço Reservado para Texto 1">
             <a:extLst>
               <a:ext uri="{FF2B5EF4-FFF2-40B4-BE49-F238E27FC236}">
-                <a16:creationId xmlns="" xmlns:a16="http://schemas.microsoft.com/office/drawing/2014/main" id="{E8B0A577-E3E3-4D35-AA82-89ED5D5451DD}"/>
+                <a16:creationId xmlns:a16="http://schemas.microsoft.com/office/drawing/2014/main" id="{E8B0A577-E3E3-4D35-AA82-89ED5D5451DD}"/>
               </a:ext>
             </a:extLst>
           </p:cNvPr>
@@ -24108,7 +24108,7 @@
           <p:cNvPr id="4" name="Espaço Reservado para Texto 3">
             <a:extLst>
               <a:ext uri="{FF2B5EF4-FFF2-40B4-BE49-F238E27FC236}">
-                <a16:creationId xmlns="" xmlns:a16="http://schemas.microsoft.com/office/drawing/2014/main" id="{C3037102-7C2A-48BA-B19A-E0AB7B0EF163}"/>
+                <a16:creationId xmlns:a16="http://schemas.microsoft.com/office/drawing/2014/main" id="{C3037102-7C2A-48BA-B19A-E0AB7B0EF163}"/>
               </a:ext>
             </a:extLst>
           </p:cNvPr>
@@ -24143,33 +24143,24 @@
               <a:t>&lt; </a:t>
             </a:r>
             <a:r>
-              <a:rPr lang="pt-BR" dirty="0" err="1" smtClean="0"/>
+              <a:rPr lang="pt-BR" dirty="0" err="1"/>
               <a:t>GOTravel</a:t>
             </a:r>
             <a:r>
-              <a:rPr lang="pt-BR" dirty="0" smtClean="0"/>
+              <a:rPr lang="pt-BR" dirty="0"/>
               <a:t>!&gt; </a:t>
             </a:r>
-            <a:endParaRPr lang="pt-BR" dirty="0"/>
           </a:p>
           <a:p>
             <a:r>
               <a:rPr lang="pt-BR" dirty="0"/>
-              <a:t>Data: </a:t>
-            </a:r>
-            <a:r>
-              <a:rPr lang="pt-BR" dirty="0" smtClean="0"/>
-              <a:t>28/09/2020</a:t>
+              <a:t>Data: 28/09/2020</a:t>
             </a:r>
           </a:p>
           <a:p>
             <a:r>
-              <a:rPr lang="pt-BR" dirty="0" smtClean="0"/>
-              <a:t>Professor</a:t>
-            </a:r>
-            <a:r>
               <a:rPr lang="pt-BR" dirty="0"/>
-              <a:t>.: Alexander Barreira</a:t>
+              <a:t>Professor.: Alexander Barreira</a:t>
             </a:r>
           </a:p>
           <a:p>
@@ -24187,13 +24178,6 @@
   <p:clrMapOvr>
     <a:masterClrMapping/>
   </p:clrMapOvr>
-  <p:timing>
-    <p:tnLst>
-      <p:par>
-        <p:cTn id="1" dur="indefinite" restart="never" nodeType="tmRoot"/>
-      </p:par>
-    </p:tnLst>
-  </p:timing>
 </p:sld>
 </file>
 
@@ -24308,20 +24292,10 @@
                 <a:latin typeface="Simplon Oi Headline"/>
                 <a:cs typeface="Simplon Oi Headline"/>
               </a:rPr>
-              <a:t>S</a:t>
+              <a:t>Status </a:t>
             </a:r>
             <a:r>
-              <a:rPr lang="en-US" sz="2646" dirty="0" smtClean="0">
-                <a:solidFill>
-                  <a:prstClr val="black"/>
-                </a:solidFill>
-                <a:latin typeface="Simplon Oi Headline"/>
-                <a:cs typeface="Simplon Oi Headline"/>
-              </a:rPr>
-              <a:t>tatus </a:t>
-            </a:r>
-            <a:r>
-              <a:rPr lang="en-US" sz="2646" dirty="0" err="1" smtClean="0">
+              <a:rPr lang="en-US" sz="2646" dirty="0" err="1">
                 <a:solidFill>
                   <a:prstClr val="black"/>
                 </a:solidFill>
@@ -24331,7 +24305,7 @@
               <a:t>geral</a:t>
             </a:r>
             <a:r>
-              <a:rPr lang="en-US" sz="2646" dirty="0" smtClean="0">
+              <a:rPr lang="en-US" sz="2646" dirty="0">
                 <a:solidFill>
                   <a:prstClr val="black"/>
                 </a:solidFill>
@@ -24341,7 +24315,7 @@
               <a:t> – </a:t>
             </a:r>
             <a:r>
-              <a:rPr lang="en-US" sz="2646" dirty="0" err="1" smtClean="0">
+              <a:rPr lang="en-US" sz="2646" dirty="0" err="1">
                 <a:solidFill>
                   <a:prstClr val="black"/>
                 </a:solidFill>
@@ -24351,7 +24325,7 @@
               <a:t>GOTravel</a:t>
             </a:r>
             <a:r>
-              <a:rPr lang="en-US" sz="2646" dirty="0" smtClean="0">
+              <a:rPr lang="en-US" sz="2646" dirty="0">
                 <a:solidFill>
                   <a:prstClr val="black"/>
                 </a:solidFill>
@@ -24360,13 +24334,6 @@
               </a:rPr>
               <a:t>!</a:t>
             </a:r>
-            <a:endParaRPr lang="en-US" sz="2646" dirty="0">
-              <a:solidFill>
-                <a:prstClr val="black"/>
-              </a:solidFill>
-              <a:latin typeface="Simplon Oi Headline"/>
-              <a:cs typeface="Simplon Oi Headline"/>
-            </a:endParaRPr>
           </a:p>
         </p:txBody>
       </p:sp>
@@ -24732,9 +24699,9 @@
         </p:nvGrpSpPr>
         <p:grpSpPr>
           <a:xfrm>
-            <a:off x="10852497" y="245656"/>
-            <a:ext cx="899678" cy="316238"/>
-            <a:chOff x="6034168" y="85799"/>
+            <a:off x="10842608" y="245656"/>
+            <a:ext cx="899679" cy="316238"/>
+            <a:chOff x="6027434" y="85799"/>
             <a:chExt cx="612000" cy="215119"/>
           </a:xfrm>
         </p:grpSpPr>
@@ -24746,7 +24713,7 @@
           </p:nvSpPr>
           <p:spPr>
             <a:xfrm>
-              <a:off x="6034168" y="85799"/>
+              <a:off x="6027434" y="85799"/>
               <a:ext cx="612000" cy="215119"/>
             </a:xfrm>
             <a:prstGeom prst="roundRect">
@@ -24807,62 +24774,6 @@
               <a:avLst/>
             </a:prstGeom>
             <a:noFill/>
-            <a:ln w="12700">
-              <a:solidFill>
-                <a:schemeClr val="accent3"/>
-              </a:solidFill>
-            </a:ln>
-          </p:spPr>
-          <p:style>
-            <a:lnRef idx="2">
-              <a:schemeClr val="accent1">
-                <a:shade val="50000"/>
-              </a:schemeClr>
-            </a:lnRef>
-            <a:fillRef idx="1">
-              <a:schemeClr val="accent1"/>
-            </a:fillRef>
-            <a:effectRef idx="0">
-              <a:schemeClr val="accent1"/>
-            </a:effectRef>
-            <a:fontRef idx="minor">
-              <a:schemeClr val="lt1"/>
-            </a:fontRef>
-          </p:style>
-          <p:txBody>
-            <a:bodyPr wrap="none" lIns="52922" tIns="52922" rIns="52922" rtlCol="0" anchor="ctr"/>
-            <a:lstStyle/>
-            <a:p>
-              <a:pPr algn="ctr" defTabSz="672130"/>
-              <a:endParaRPr lang="en-US" sz="1176" dirty="0">
-                <a:solidFill>
-                  <a:prstClr val="black"/>
-                </a:solidFill>
-                <a:latin typeface="Simplon BP Regular"/>
-                <a:cs typeface="Simplon BP Regular"/>
-              </a:endParaRPr>
-            </a:p>
-          </p:txBody>
-        </p:sp>
-        <p:sp>
-          <p:nvSpPr>
-            <p:cNvPr id="109" name="Oval 120"/>
-            <p:cNvSpPr>
-              <a:spLocks noChangeAspect="1"/>
-            </p:cNvSpPr>
-            <p:nvPr/>
-          </p:nvSpPr>
-          <p:spPr>
-            <a:xfrm>
-              <a:off x="6266404" y="121358"/>
-              <a:ext cx="143806" cy="144000"/>
-            </a:xfrm>
-            <a:prstGeom prst="ellipse">
-              <a:avLst/>
-            </a:prstGeom>
-            <a:solidFill>
-              <a:srgbClr val="FFC000"/>
-            </a:solidFill>
             <a:ln w="12700">
               <a:solidFill>
                 <a:schemeClr val="accent3"/>
@@ -26234,27 +26145,7 @@
                 <a:latin typeface="Calibri" panose="020F0502020204030204" pitchFamily="34" charset="0"/>
                 <a:cs typeface="Simplon BP Regular"/>
               </a:rPr>
-              <a:t>O que foi superado na </a:t>
-            </a:r>
-            <a:r>
-              <a:rPr lang="pt-BR" sz="2000" b="1" dirty="0" smtClean="0">
-                <a:solidFill>
-                  <a:schemeClr val="tx1"/>
-                </a:solidFill>
-                <a:latin typeface="Calibri" panose="020F0502020204030204" pitchFamily="34" charset="0"/>
-                <a:cs typeface="Simplon BP Regular"/>
-              </a:rPr>
-              <a:t>última </a:t>
-            </a:r>
-            <a:r>
-              <a:rPr lang="pt-BR" sz="2000" b="1" dirty="0">
-                <a:solidFill>
-                  <a:schemeClr val="tx1"/>
-                </a:solidFill>
-                <a:latin typeface="Calibri" panose="020F0502020204030204" pitchFamily="34" charset="0"/>
-                <a:cs typeface="Simplon BP Regular"/>
-              </a:rPr>
-              <a:t>semana </a:t>
+              <a:t>O que foi superado na última semana </a:t>
             </a:r>
           </a:p>
           <a:p>
@@ -26267,14 +26158,24 @@
               <a:defRPr/>
             </a:pPr>
             <a:r>
-              <a:rPr lang="pt-BR" sz="1323" b="1" dirty="0" smtClean="0">
+              <a:rPr lang="pt-BR" sz="1323" dirty="0">
                 <a:solidFill>
                   <a:schemeClr val="tx1"/>
                 </a:solidFill>
                 <a:latin typeface="Calibri" panose="020F0502020204030204" pitchFamily="34" charset="0"/>
                 <a:cs typeface="Simplon BP Regular"/>
               </a:rPr>
-              <a:t>Diagrama de classe concluído</a:t>
+              <a:t>BPMN</a:t>
+            </a:r>
+            <a:r>
+              <a:rPr lang="pt-BR" sz="1323" b="1" dirty="0">
+                <a:solidFill>
+                  <a:schemeClr val="tx1"/>
+                </a:solidFill>
+                <a:latin typeface="Calibri" panose="020F0502020204030204" pitchFamily="34" charset="0"/>
+                <a:cs typeface="Simplon BP Regular"/>
+              </a:rPr>
+              <a:t> </a:t>
             </a:r>
           </a:p>
           <a:p>
@@ -26287,46 +26188,36 @@
               <a:defRPr/>
             </a:pPr>
             <a:r>
-              <a:rPr lang="pt-BR" sz="1323" b="1" dirty="0" smtClean="0">
+              <a:rPr lang="pt-BR" sz="1323" dirty="0" err="1">
                 <a:solidFill>
                   <a:schemeClr val="tx1"/>
                 </a:solidFill>
                 <a:latin typeface="Calibri" panose="020F0502020204030204" pitchFamily="34" charset="0"/>
                 <a:cs typeface="Simplon BP Regular"/>
               </a:rPr>
-              <a:t>Iniciado a aplicação Java</a:t>
+              <a:t>Wireframes</a:t>
             </a:r>
-          </a:p>
-          <a:p>
-            <a:pPr marL="252049" indent="-252049" fontAlgn="base">
-              <a:spcBef>
-                <a:spcPct val="0"/>
-              </a:spcBef>
-              <a:buFont typeface="Wingdings" panose="05000000000000000000" pitchFamily="2" charset="2"/>
-              <a:buChar char="ü"/>
-              <a:defRPr/>
-            </a:pPr>
             <a:r>
-              <a:rPr lang="pt-BR" sz="1323" b="1" dirty="0" smtClean="0">
+              <a:rPr lang="pt-BR" sz="1323" dirty="0">
                 <a:solidFill>
                   <a:schemeClr val="tx1"/>
                 </a:solidFill>
                 <a:latin typeface="Calibri" panose="020F0502020204030204" pitchFamily="34" charset="0"/>
                 <a:cs typeface="Simplon BP Regular"/>
               </a:rPr>
-              <a:t>Iniciado o desenvolvimento das telas em </a:t>
+              <a:t> do Front </a:t>
             </a:r>
             <a:r>
-              <a:rPr lang="pt-BR" sz="1323" b="1" dirty="0" err="1" smtClean="0">
+              <a:rPr lang="pt-BR" sz="1323" dirty="0" err="1">
                 <a:solidFill>
                   <a:schemeClr val="tx1"/>
                 </a:solidFill>
                 <a:latin typeface="Calibri" panose="020F0502020204030204" pitchFamily="34" charset="0"/>
                 <a:cs typeface="Simplon BP Regular"/>
               </a:rPr>
-              <a:t>React</a:t>
+              <a:t>End</a:t>
             </a:r>
-            <a:endParaRPr lang="pt-BR" sz="1323" b="1" dirty="0" smtClean="0">
+            <a:endParaRPr lang="pt-BR" sz="1323" dirty="0">
               <a:solidFill>
                 <a:schemeClr val="tx1"/>
               </a:solidFill>
@@ -26344,24 +26235,14 @@
               <a:defRPr/>
             </a:pPr>
             <a:r>
-              <a:rPr lang="pt-BR" sz="1323" b="1" dirty="0" err="1" smtClean="0">
+              <a:rPr lang="pt-BR" sz="1323" dirty="0">
                 <a:solidFill>
                   <a:schemeClr val="tx1"/>
                 </a:solidFill>
                 <a:latin typeface="Calibri" panose="020F0502020204030204" pitchFamily="34" charset="0"/>
                 <a:cs typeface="Simplon BP Regular"/>
               </a:rPr>
-              <a:t>Backlog</a:t>
-            </a:r>
-            <a:r>
-              <a:rPr lang="pt-BR" sz="1323" b="1" dirty="0" smtClean="0">
-                <a:solidFill>
-                  <a:schemeClr val="tx1"/>
-                </a:solidFill>
-                <a:latin typeface="Calibri" panose="020F0502020204030204" pitchFamily="34" charset="0"/>
-                <a:cs typeface="Simplon BP Regular"/>
-              </a:rPr>
-              <a:t> atualizado</a:t>
+              <a:t>Homepage </a:t>
             </a:r>
           </a:p>
           <a:p>
@@ -26374,24 +26255,106 @@
               <a:defRPr/>
             </a:pPr>
             <a:r>
-              <a:rPr lang="pt-BR" sz="1323" b="1" dirty="0" smtClean="0">
+              <a:rPr lang="pt-BR" sz="1323" dirty="0">
                 <a:solidFill>
                   <a:schemeClr val="tx1"/>
                 </a:solidFill>
                 <a:latin typeface="Calibri" panose="020F0502020204030204" pitchFamily="34" charset="0"/>
                 <a:cs typeface="Simplon BP Regular"/>
               </a:rPr>
-              <a:t>Dicionário de dados feito</a:t>
+              <a:t>Validação de login (</a:t>
+            </a:r>
+            <a:r>
+              <a:rPr lang="pt-BR" sz="1323" dirty="0" err="1">
+                <a:solidFill>
+                  <a:schemeClr val="tx1"/>
+                </a:solidFill>
+                <a:latin typeface="Calibri" panose="020F0502020204030204" pitchFamily="34" charset="0"/>
+                <a:cs typeface="Simplon BP Regular"/>
+              </a:rPr>
+              <a:t>backend</a:t>
+            </a:r>
+            <a:r>
+              <a:rPr lang="pt-BR" sz="1323" dirty="0">
+                <a:solidFill>
+                  <a:schemeClr val="tx1"/>
+                </a:solidFill>
+                <a:latin typeface="Calibri" panose="020F0502020204030204" pitchFamily="34" charset="0"/>
+                <a:cs typeface="Simplon BP Regular"/>
+              </a:rPr>
+              <a:t>)</a:t>
             </a:r>
           </a:p>
           <a:p>
-            <a:pPr fontAlgn="base">
+            <a:pPr marL="252049" indent="-252049" fontAlgn="base">
               <a:spcBef>
                 <a:spcPct val="0"/>
               </a:spcBef>
+              <a:buFont typeface="Wingdings" panose="05000000000000000000" pitchFamily="2" charset="2"/>
+              <a:buChar char="ü"/>
               <a:defRPr/>
             </a:pPr>
-            <a:endParaRPr lang="pt-BR" sz="1323" b="1" dirty="0">
+            <a:r>
+              <a:rPr lang="pt-BR" sz="1323" dirty="0">
+                <a:solidFill>
+                  <a:schemeClr val="tx1"/>
+                </a:solidFill>
+                <a:latin typeface="Calibri" panose="020F0502020204030204" pitchFamily="34" charset="0"/>
+                <a:cs typeface="Simplon BP Regular"/>
+              </a:rPr>
+              <a:t>Aplicação Hospedada no </a:t>
+            </a:r>
+            <a:r>
+              <a:rPr lang="pt-BR" sz="1323" dirty="0" err="1">
+                <a:solidFill>
+                  <a:schemeClr val="tx1"/>
+                </a:solidFill>
+                <a:latin typeface="Calibri" panose="020F0502020204030204" pitchFamily="34" charset="0"/>
+                <a:cs typeface="Simplon BP Regular"/>
+              </a:rPr>
+              <a:t>Heroku</a:t>
+            </a:r>
+            <a:r>
+              <a:rPr lang="pt-BR" sz="1323" dirty="0">
+                <a:solidFill>
+                  <a:schemeClr val="tx1"/>
+                </a:solidFill>
+                <a:latin typeface="Calibri" panose="020F0502020204030204" pitchFamily="34" charset="0"/>
+                <a:cs typeface="Simplon BP Regular"/>
+              </a:rPr>
+              <a:t> </a:t>
+            </a:r>
+          </a:p>
+          <a:p>
+            <a:pPr marL="252049" indent="-252049" fontAlgn="base">
+              <a:spcBef>
+                <a:spcPct val="0"/>
+              </a:spcBef>
+              <a:buFont typeface="Wingdings" panose="05000000000000000000" pitchFamily="2" charset="2"/>
+              <a:buChar char="ü"/>
+              <a:defRPr/>
+            </a:pPr>
+            <a:r>
+              <a:rPr lang="pt-BR" sz="1323" dirty="0">
+                <a:solidFill>
+                  <a:schemeClr val="tx1"/>
+                </a:solidFill>
+                <a:latin typeface="Calibri" panose="020F0502020204030204" pitchFamily="34" charset="0"/>
+                <a:cs typeface="Simplon BP Regular"/>
+              </a:rPr>
+              <a:t>Diagrama de entidade e relacionamento</a:t>
+            </a:r>
+          </a:p>
+          <a:p>
+            <a:pPr marL="252049" indent="-252049" fontAlgn="base">
+              <a:spcBef>
+                <a:spcPct val="0"/>
+              </a:spcBef>
+              <a:buFont typeface="Wingdings" panose="05000000000000000000" pitchFamily="2" charset="2"/>
+              <a:buChar char="ü"/>
+              <a:defRPr/>
+            </a:pPr>
+            <a:endParaRPr lang="pt-BR" sz="1323" dirty="0">
               <a:solidFill>
                 <a:schemeClr val="tx1"/>
               </a:solidFill>
@@ -26408,7 +26371,7 @@
               <a:buChar char="ü"/>
               <a:defRPr/>
             </a:pPr>
-            <a:endParaRPr lang="pt-BR" sz="1323" b="1" dirty="0">
+            <a:endParaRPr lang="pt-BR" sz="1323" dirty="0">
               <a:solidFill>
                 <a:schemeClr val="tx1"/>
               </a:solidFill>
@@ -26425,7 +26388,7 @@
               <a:buChar char="ü"/>
               <a:defRPr/>
             </a:pPr>
-            <a:endParaRPr lang="pt-BR" sz="1323" b="1" dirty="0">
+            <a:endParaRPr lang="pt-BR" sz="1323" dirty="0">
               <a:solidFill>
                 <a:schemeClr val="tx1"/>
               </a:solidFill>
@@ -26484,14 +26447,7 @@
                 <a:latin typeface="Calibri" panose="020F0502020204030204" pitchFamily="34" charset="0"/>
                 <a:cs typeface="Simplon BP Regular"/>
               </a:rPr>
-              <a:t>Pontos de riscos ou assuntos que devem ser resolvidos com urgência para o bom andamento do </a:t>
-            </a:r>
-            <a:r>
-              <a:rPr lang="pt-BR" sz="2000" b="1" dirty="0" smtClean="0">
-                <a:latin typeface="Calibri" panose="020F0502020204030204" pitchFamily="34" charset="0"/>
-                <a:cs typeface="Simplon BP Regular"/>
-              </a:rPr>
-              <a:t>projeto</a:t>
+              <a:t>Pontos de riscos ou assuntos que devem ser resolvidos com urgência para o bom andamento do projeto</a:t>
             </a:r>
           </a:p>
           <a:p>
@@ -26504,27 +26460,27 @@
               <a:defRPr/>
             </a:pPr>
             <a:r>
-              <a:rPr lang="pt-BR" sz="1320" b="1" dirty="0" err="1" smtClean="0">
+              <a:rPr lang="pt-BR" sz="1320" b="1" dirty="0" err="1">
                 <a:latin typeface="Calibri" panose="020F0502020204030204" pitchFamily="34" charset="0"/>
                 <a:cs typeface="Simplon BP Regular"/>
               </a:rPr>
               <a:t>Api</a:t>
             </a:r>
             <a:r>
-              <a:rPr lang="pt-BR" sz="1320" b="1" dirty="0" smtClean="0">
+              <a:rPr lang="pt-BR" sz="1320" b="1" dirty="0">
                 <a:latin typeface="Calibri" panose="020F0502020204030204" pitchFamily="34" charset="0"/>
                 <a:cs typeface="Simplon BP Regular"/>
               </a:rPr>
               <a:t> do Google </a:t>
             </a:r>
             <a:r>
-              <a:rPr lang="pt-BR" sz="1320" b="1" dirty="0" err="1" smtClean="0">
+              <a:rPr lang="pt-BR" sz="1320" b="1" dirty="0" err="1">
                 <a:latin typeface="Calibri" panose="020F0502020204030204" pitchFamily="34" charset="0"/>
                 <a:cs typeface="Simplon BP Regular"/>
               </a:rPr>
               <a:t>Maps</a:t>
             </a:r>
-            <a:endParaRPr lang="pt-BR" sz="1320" b="1" dirty="0" smtClean="0">
+            <a:endParaRPr lang="pt-BR" sz="1320" b="1" dirty="0">
               <a:latin typeface="Calibri" panose="020F0502020204030204" pitchFamily="34" charset="0"/>
               <a:cs typeface="Simplon BP Regular"/>
             </a:endParaRPr>
@@ -26564,7 +26520,7 @@
           <p:cNvPr id="2" name="Rectangle 43">
             <a:extLst>
               <a:ext uri="{FF2B5EF4-FFF2-40B4-BE49-F238E27FC236}">
-                <a16:creationId xmlns="" xmlns:a16="http://schemas.microsoft.com/office/drawing/2014/main" id="{B15BA19F-C787-4E6A-ADAB-C0DFF09C66A8}"/>
+                <a16:creationId xmlns:a16="http://schemas.microsoft.com/office/drawing/2014/main" id="{B15BA19F-C787-4E6A-ADAB-C0DFF09C66A8}"/>
               </a:ext>
             </a:extLst>
           </p:cNvPr>
@@ -26617,62 +26573,6 @@
                 <a:latin typeface="Calibri" panose="020F0502020204030204" pitchFamily="34" charset="0"/>
                 <a:cs typeface="Simplon BP Regular"/>
               </a:rPr>
-              <a:t>Frente Plataforma</a:t>
-            </a:r>
-          </a:p>
-          <a:p>
-            <a:pPr marL="252049" lvl="1" indent="-252049" defTabSz="672130">
-              <a:buFont typeface="Wingdings" charset="2"/>
-              <a:buChar char="§"/>
-            </a:pPr>
-            <a:r>
-              <a:rPr lang="pt-BR" sz="1323" dirty="0" smtClean="0">
-                <a:solidFill>
-                  <a:schemeClr val="tx1"/>
-                </a:solidFill>
-                <a:latin typeface="Calibri" panose="020F0502020204030204" pitchFamily="34" charset="0"/>
-                <a:cs typeface="Simplon BP Regular"/>
-              </a:rPr>
-              <a:t>Subir a aplicação Spring no </a:t>
-            </a:r>
-            <a:r>
-              <a:rPr lang="pt-BR" sz="1323" dirty="0" err="1" smtClean="0">
-                <a:solidFill>
-                  <a:schemeClr val="tx1"/>
-                </a:solidFill>
-                <a:latin typeface="Calibri" panose="020F0502020204030204" pitchFamily="34" charset="0"/>
-                <a:cs typeface="Simplon BP Regular"/>
-              </a:rPr>
-              <a:t>Heroku</a:t>
-            </a:r>
-            <a:endParaRPr lang="pt-BR" sz="1323" dirty="0" smtClean="0">
-              <a:solidFill>
-                <a:schemeClr val="tx1"/>
-              </a:solidFill>
-              <a:latin typeface="Calibri" panose="020F0502020204030204" pitchFamily="34" charset="0"/>
-              <a:cs typeface="Simplon BP Regular"/>
-            </a:endParaRPr>
-          </a:p>
-          <a:p>
-            <a:pPr marL="0" lvl="1" defTabSz="672130"/>
-            <a:endParaRPr lang="pt-BR" sz="1323" b="1" dirty="0">
-              <a:solidFill>
-                <a:schemeClr val="tx1"/>
-              </a:solidFill>
-              <a:latin typeface="Calibri" panose="020F0502020204030204" pitchFamily="34" charset="0"/>
-              <a:cs typeface="Simplon BP Regular"/>
-            </a:endParaRPr>
-          </a:p>
-          <a:p>
-            <a:pPr marL="0" lvl="1" defTabSz="672130"/>
-            <a:r>
-              <a:rPr lang="pt-BR" sz="1323" b="1" dirty="0">
-                <a:solidFill>
-                  <a:schemeClr val="tx1"/>
-                </a:solidFill>
-                <a:latin typeface="Calibri" panose="020F0502020204030204" pitchFamily="34" charset="0"/>
-                <a:cs typeface="Simplon BP Regular"/>
-              </a:rPr>
               <a:t>Frente </a:t>
             </a:r>
             <a:r>
@@ -26699,32 +26599,47 @@
               <a:buChar char="§"/>
             </a:pPr>
             <a:r>
-              <a:rPr lang="pt-BR" sz="1323" dirty="0" smtClean="0">
+              <a:rPr lang="pt-BR" sz="1323" dirty="0">
                 <a:solidFill>
                   <a:schemeClr val="tx1"/>
                 </a:solidFill>
                 <a:latin typeface="Calibri" panose="020F0502020204030204" pitchFamily="34" charset="0"/>
                 <a:cs typeface="Simplon BP Regular"/>
               </a:rPr>
-              <a:t>Validação de </a:t>
+              <a:t>Validação de login</a:t>
             </a:r>
+          </a:p>
+          <a:p>
+            <a:pPr marL="252049" lvl="1" indent="-252049">
+              <a:buFont typeface="Wingdings" panose="05000000000000000000" pitchFamily="2" charset="2"/>
+              <a:buChar char="§"/>
+            </a:pPr>
             <a:r>
-              <a:rPr lang="pt-BR" sz="1323" dirty="0" err="1" smtClean="0">
+              <a:rPr lang="pt-BR" sz="1323" dirty="0">
                 <a:solidFill>
                   <a:schemeClr val="tx1"/>
                 </a:solidFill>
                 <a:latin typeface="Calibri" panose="020F0502020204030204" pitchFamily="34" charset="0"/>
                 <a:cs typeface="Simplon BP Regular"/>
               </a:rPr>
-              <a:t>login</a:t>
+              <a:t>Gerar arquivo de itinerário</a:t>
             </a:r>
-            <a:endParaRPr lang="pt-BR" sz="1323" dirty="0" smtClean="0">
-              <a:solidFill>
-                <a:schemeClr val="tx1"/>
-              </a:solidFill>
-              <a:latin typeface="Calibri" panose="020F0502020204030204" pitchFamily="34" charset="0"/>
-              <a:cs typeface="Simplon BP Regular"/>
-            </a:endParaRPr>
+          </a:p>
+          <a:p>
+            <a:pPr marL="252049" lvl="1" indent="-252049">
+              <a:buFont typeface="Wingdings" panose="05000000000000000000" pitchFamily="2" charset="2"/>
+              <a:buChar char="§"/>
+            </a:pPr>
+            <a:r>
+              <a:rPr lang="pt-BR" sz="1323" dirty="0">
+                <a:solidFill>
+                  <a:schemeClr val="tx1"/>
+                </a:solidFill>
+                <a:latin typeface="Calibri" panose="020F0502020204030204" pitchFamily="34" charset="0"/>
+                <a:cs typeface="Simplon BP Regular"/>
+              </a:rPr>
+              <a:t>Definir dados a serem enviados </a:t>
+            </a:r>
           </a:p>
           <a:p>
             <a:pPr marL="0" lvl="1"/>
@@ -26749,7 +26664,7 @@
               <a:t>Frente Front </a:t>
             </a:r>
             <a:r>
-              <a:rPr lang="pt-BR" sz="1323" b="1" dirty="0" err="1" smtClean="0">
+              <a:rPr lang="pt-BR" sz="1323" b="1" dirty="0" err="1">
                 <a:solidFill>
                   <a:schemeClr val="tx1"/>
                 </a:solidFill>
@@ -26758,7 +26673,7 @@
               </a:rPr>
               <a:t>end</a:t>
             </a:r>
-            <a:endParaRPr lang="pt-BR" sz="1323" b="1" dirty="0" smtClean="0">
+            <a:endParaRPr lang="pt-BR" sz="1323" b="1" dirty="0">
               <a:solidFill>
                 <a:schemeClr val="tx1"/>
               </a:solidFill>
@@ -26772,32 +26687,15 @@
               <a:buChar char="•"/>
             </a:pPr>
             <a:r>
-              <a:rPr lang="pt-BR" sz="1323" dirty="0" smtClean="0">
+              <a:rPr lang="pt-BR" sz="1323" dirty="0">
                 <a:solidFill>
                   <a:schemeClr val="tx1"/>
                 </a:solidFill>
                 <a:latin typeface="Calibri" panose="020F0502020204030204" pitchFamily="34" charset="0"/>
                 <a:cs typeface="Simplon BP Regular"/>
               </a:rPr>
-              <a:t>Término dos </a:t>
+              <a:t>Finalizar login e cadastro </a:t>
             </a:r>
-            <a:r>
-              <a:rPr lang="pt-BR" sz="1323" dirty="0" err="1" smtClean="0">
-                <a:solidFill>
-                  <a:schemeClr val="tx1"/>
-                </a:solidFill>
-                <a:latin typeface="Calibri" panose="020F0502020204030204" pitchFamily="34" charset="0"/>
-                <a:cs typeface="Simplon BP Regular"/>
-              </a:rPr>
-              <a:t>wireframes</a:t>
-            </a:r>
-            <a:endParaRPr lang="pt-BR" sz="1323" dirty="0" smtClean="0">
-              <a:solidFill>
-                <a:schemeClr val="tx1"/>
-              </a:solidFill>
-              <a:latin typeface="Calibri" panose="020F0502020204030204" pitchFamily="34" charset="0"/>
-              <a:cs typeface="Simplon BP Regular"/>
-            </a:endParaRPr>
           </a:p>
           <a:p>
             <a:pPr marL="285750" lvl="1" indent="-285750" defTabSz="672130">
@@ -26805,101 +26703,18 @@
               <a:buChar char="•"/>
             </a:pPr>
             <a:r>
-              <a:rPr lang="pt-BR" sz="1323" dirty="0" smtClean="0">
+              <a:rPr lang="pt-BR" sz="1323" dirty="0">
                 <a:solidFill>
                   <a:schemeClr val="tx1"/>
                 </a:solidFill>
                 <a:latin typeface="Calibri" panose="020F0502020204030204" pitchFamily="34" charset="0"/>
                 <a:cs typeface="Simplon BP Regular"/>
               </a:rPr>
-              <a:t>Continuação do desenvolvimento da tela Homepage em </a:t>
+              <a:t>Estilização da validação de dados </a:t>
             </a:r>
-            <a:r>
-              <a:rPr lang="pt-BR" sz="1323" dirty="0" err="1">
-                <a:solidFill>
-                  <a:schemeClr val="tx1"/>
-                </a:solidFill>
-                <a:latin typeface="Calibri" panose="020F0502020204030204" pitchFamily="34" charset="0"/>
-                <a:cs typeface="Simplon BP Regular"/>
-              </a:rPr>
-              <a:t>R</a:t>
-            </a:r>
-            <a:r>
-              <a:rPr lang="pt-BR" sz="1323" dirty="0" err="1" smtClean="0">
-                <a:solidFill>
-                  <a:schemeClr val="tx1"/>
-                </a:solidFill>
-                <a:latin typeface="Calibri" panose="020F0502020204030204" pitchFamily="34" charset="0"/>
-                <a:cs typeface="Simplon BP Regular"/>
-              </a:rPr>
-              <a:t>eact</a:t>
-            </a:r>
-            <a:endParaRPr lang="pt-BR" sz="1323" dirty="0" smtClean="0">
-              <a:solidFill>
-                <a:schemeClr val="tx1"/>
-              </a:solidFill>
-              <a:latin typeface="Calibri" panose="020F0502020204030204" pitchFamily="34" charset="0"/>
-              <a:cs typeface="Simplon BP Regular"/>
-            </a:endParaRPr>
           </a:p>
           <a:p>
-            <a:pPr marL="285750" lvl="1" indent="-285750" defTabSz="672130">
-              <a:buFont typeface="Arial" panose="020B0604020202020204" pitchFamily="34" charset="0"/>
-              <a:buChar char="•"/>
-            </a:pPr>
-            <a:r>
-              <a:rPr lang="pt-BR" sz="1323" dirty="0" smtClean="0">
-                <a:solidFill>
-                  <a:schemeClr val="tx1"/>
-                </a:solidFill>
-                <a:latin typeface="Calibri" panose="020F0502020204030204" pitchFamily="34" charset="0"/>
-                <a:cs typeface="Simplon BP Regular"/>
-              </a:rPr>
-              <a:t>Inicio do desenvolvimento das telas de </a:t>
-            </a:r>
-            <a:r>
-              <a:rPr lang="pt-BR" sz="1323" dirty="0" err="1" smtClean="0">
-                <a:solidFill>
-                  <a:schemeClr val="tx1"/>
-                </a:solidFill>
-                <a:latin typeface="Calibri" panose="020F0502020204030204" pitchFamily="34" charset="0"/>
-                <a:cs typeface="Simplon BP Regular"/>
-              </a:rPr>
-              <a:t>login</a:t>
-            </a:r>
-            <a:r>
-              <a:rPr lang="pt-BR" sz="1323" dirty="0" smtClean="0">
-                <a:solidFill>
-                  <a:schemeClr val="tx1"/>
-                </a:solidFill>
-                <a:latin typeface="Calibri" panose="020F0502020204030204" pitchFamily="34" charset="0"/>
-                <a:cs typeface="Simplon BP Regular"/>
-              </a:rPr>
-              <a:t> </a:t>
-            </a:r>
-            <a:r>
-              <a:rPr lang="pt-BR" sz="1323" smtClean="0">
-                <a:solidFill>
-                  <a:schemeClr val="tx1"/>
-                </a:solidFill>
-                <a:latin typeface="Calibri" panose="020F0502020204030204" pitchFamily="34" charset="0"/>
-                <a:cs typeface="Simplon BP Regular"/>
-              </a:rPr>
-              <a:t>e cadastro</a:t>
-            </a:r>
-            <a:endParaRPr lang="pt-BR" sz="1323" dirty="0" smtClean="0">
-              <a:solidFill>
-                <a:schemeClr val="tx1"/>
-              </a:solidFill>
-              <a:latin typeface="Calibri" panose="020F0502020204030204" pitchFamily="34" charset="0"/>
-              <a:cs typeface="Simplon BP Regular"/>
-            </a:endParaRPr>
-          </a:p>
-          <a:p>
-            <a:pPr marL="285750" lvl="1" indent="-285750" defTabSz="672130">
-              <a:buFont typeface="Arial" panose="020B0604020202020204" pitchFamily="34" charset="0"/>
-              <a:buChar char="•"/>
-            </a:pPr>
+            <a:pPr marL="0" lvl="1" defTabSz="672130"/>
             <a:endParaRPr lang="pt-BR" sz="1323" dirty="0">
               <a:solidFill>
                 <a:schemeClr val="tx1"/>
@@ -26911,7 +26726,7 @@
           <a:p>
             <a:pPr marL="0" lvl="1" defTabSz="672130"/>
             <a:r>
-              <a:rPr lang="pt-BR" sz="1323" b="1" dirty="0" smtClean="0">
+              <a:rPr lang="pt-BR" sz="1323" b="1" dirty="0">
                 <a:solidFill>
                   <a:schemeClr val="tx1"/>
                 </a:solidFill>
@@ -26927,67 +26742,14 @@
               <a:buChar char="•"/>
             </a:pPr>
             <a:r>
-              <a:rPr lang="pt-BR" sz="1323" dirty="0" smtClean="0">
+              <a:rPr lang="pt-BR" sz="1323" dirty="0">
                 <a:solidFill>
                   <a:schemeClr val="tx1"/>
                 </a:solidFill>
                 <a:latin typeface="Calibri" panose="020F0502020204030204" pitchFamily="34" charset="0"/>
                 <a:cs typeface="Simplon BP Regular"/>
               </a:rPr>
-              <a:t>BPMN – </a:t>
-            </a:r>
-            <a:r>
-              <a:rPr lang="pt-BR" sz="1323" dirty="0" err="1" smtClean="0">
-                <a:solidFill>
-                  <a:schemeClr val="tx1"/>
-                </a:solidFill>
-                <a:latin typeface="Calibri" panose="020F0502020204030204" pitchFamily="34" charset="0"/>
-                <a:cs typeface="Simplon BP Regular"/>
-              </a:rPr>
-              <a:t>flow</a:t>
-            </a:r>
-            <a:r>
-              <a:rPr lang="pt-BR" sz="1323" dirty="0" smtClean="0">
-                <a:solidFill>
-                  <a:schemeClr val="tx1"/>
-                </a:solidFill>
-                <a:latin typeface="Calibri" panose="020F0502020204030204" pitchFamily="34" charset="0"/>
-                <a:cs typeface="Simplon BP Regular"/>
-              </a:rPr>
-              <a:t> do usuário – entrega para o professor</a:t>
-            </a:r>
-            <a:endParaRPr lang="pt-BR" sz="1323" dirty="0" smtClean="0">
-              <a:solidFill>
-                <a:schemeClr val="tx1"/>
-              </a:solidFill>
-              <a:latin typeface="Calibri" panose="020F0502020204030204" pitchFamily="34" charset="0"/>
-              <a:cs typeface="Simplon BP Regular"/>
-            </a:endParaRPr>
-          </a:p>
-          <a:p>
-            <a:pPr marL="285750" lvl="1" indent="-285750" defTabSz="672130">
-              <a:buFont typeface="Arial" panose="020B0604020202020204" pitchFamily="34" charset="0"/>
-              <a:buChar char="•"/>
-            </a:pPr>
-            <a:r>
-              <a:rPr lang="pt-BR" sz="1323" dirty="0" smtClean="0">
-                <a:solidFill>
-                  <a:schemeClr val="tx1"/>
-                </a:solidFill>
-                <a:latin typeface="Calibri" panose="020F0502020204030204" pitchFamily="34" charset="0"/>
-                <a:cs typeface="Simplon BP Regular"/>
-              </a:rPr>
-              <a:t>Diagrama de </a:t>
-            </a:r>
-            <a:r>
-              <a:rPr lang="pt-BR" sz="1323" dirty="0" smtClean="0">
-                <a:solidFill>
-                  <a:schemeClr val="tx1"/>
-                </a:solidFill>
-                <a:latin typeface="Calibri" panose="020F0502020204030204" pitchFamily="34" charset="0"/>
-                <a:cs typeface="Simplon BP Regular"/>
-              </a:rPr>
-              <a:t>estado</a:t>
+              <a:t>Criar vertente interna do BPMN </a:t>
             </a:r>
           </a:p>
           <a:p>
@@ -26996,62 +26758,22 @@
               <a:buChar char="•"/>
             </a:pPr>
             <a:r>
-              <a:rPr lang="pt-BR" sz="1323" dirty="0" err="1" smtClean="0">
+              <a:rPr lang="pt-BR" sz="1323" dirty="0">
                 <a:solidFill>
                   <a:schemeClr val="tx1"/>
                 </a:solidFill>
                 <a:latin typeface="Calibri" panose="020F0502020204030204" pitchFamily="34" charset="0"/>
                 <a:cs typeface="Simplon BP Regular"/>
               </a:rPr>
-              <a:t>Timeline</a:t>
+              <a:t>Diagrama de estado</a:t>
             </a:r>
-            <a:r>
-              <a:rPr lang="pt-BR" sz="1323" dirty="0" smtClean="0">
-                <a:solidFill>
-                  <a:schemeClr val="tx1"/>
-                </a:solidFill>
-                <a:latin typeface="Calibri" panose="020F0502020204030204" pitchFamily="34" charset="0"/>
-                <a:cs typeface="Simplon BP Regular"/>
-              </a:rPr>
-              <a:t> da </a:t>
-            </a:r>
-            <a:r>
-              <a:rPr lang="pt-BR" sz="1323" dirty="0" err="1" smtClean="0">
-                <a:solidFill>
-                  <a:schemeClr val="tx1"/>
-                </a:solidFill>
-                <a:latin typeface="Calibri" panose="020F0502020204030204" pitchFamily="34" charset="0"/>
-                <a:cs typeface="Simplon BP Regular"/>
-              </a:rPr>
-              <a:t>sprint</a:t>
-            </a:r>
-            <a:endParaRPr lang="pt-BR" sz="1323" dirty="0" smtClean="0">
-              <a:solidFill>
-                <a:schemeClr val="tx1"/>
-              </a:solidFill>
-              <a:latin typeface="Calibri" panose="020F0502020204030204" pitchFamily="34" charset="0"/>
-              <a:cs typeface="Simplon BP Regular"/>
-            </a:endParaRPr>
           </a:p>
           <a:p>
             <a:pPr marL="285750" lvl="1" indent="-285750" defTabSz="672130">
               <a:buFont typeface="Arial" panose="020B0604020202020204" pitchFamily="34" charset="0"/>
               <a:buChar char="•"/>
             </a:pPr>
-            <a:endParaRPr lang="pt-BR" sz="1323" dirty="0" smtClean="0">
-              <a:solidFill>
-                <a:schemeClr val="tx1"/>
-              </a:solidFill>
-              <a:latin typeface="Calibri" panose="020F0502020204030204" pitchFamily="34" charset="0"/>
-              <a:cs typeface="Simplon BP Regular"/>
-            </a:endParaRPr>
-          </a:p>
-          <a:p>
-            <a:pPr marL="285750" lvl="1" indent="-285750" defTabSz="672130">
-              <a:buFont typeface="Arial" panose="020B0604020202020204" pitchFamily="34" charset="0"/>
-              <a:buChar char="•"/>
-            </a:pPr>
-            <a:endParaRPr lang="pt-BR" sz="1323" dirty="0" smtClean="0">
+            <a:endParaRPr lang="pt-BR" sz="1323" dirty="0">
               <a:solidFill>
                 <a:schemeClr val="tx1"/>
               </a:solidFill>
@@ -27066,7 +26788,7 @@
           <p:cNvPr id="7" name="Oval 129">
             <a:extLst>
               <a:ext uri="{FF2B5EF4-FFF2-40B4-BE49-F238E27FC236}">
-                <a16:creationId xmlns="" xmlns:a16="http://schemas.microsoft.com/office/drawing/2014/main" id="{DD175998-7BC4-48E7-B48B-3AD3DB555BC2}"/>
+                <a16:creationId xmlns:a16="http://schemas.microsoft.com/office/drawing/2014/main" id="{DD175998-7BC4-48E7-B48B-3AD3DB555BC2}"/>
               </a:ext>
             </a:extLst>
           </p:cNvPr>
@@ -27128,7 +26850,7 @@
           <p:cNvPr id="8" name="TextBox 138">
             <a:extLst>
               <a:ext uri="{FF2B5EF4-FFF2-40B4-BE49-F238E27FC236}">
-                <a16:creationId xmlns="" xmlns:a16="http://schemas.microsoft.com/office/drawing/2014/main" id="{5CE7D08C-795B-4BF1-97F6-F9773F4E9F4C}"/>
+                <a16:creationId xmlns:a16="http://schemas.microsoft.com/office/drawing/2014/main" id="{5CE7D08C-795B-4BF1-97F6-F9773F4E9F4C}"/>
               </a:ext>
             </a:extLst>
           </p:cNvPr>
@@ -27274,7 +26996,7 @@
           <p:cNvPr id="10" name="Oval 114">
             <a:extLst>
               <a:ext uri="{FF2B5EF4-FFF2-40B4-BE49-F238E27FC236}">
-                <a16:creationId xmlns="" xmlns:a16="http://schemas.microsoft.com/office/drawing/2014/main" id="{2C0D7151-D7C4-4C3E-8608-61515AFD4BD7}"/>
+                <a16:creationId xmlns:a16="http://schemas.microsoft.com/office/drawing/2014/main" id="{2C0D7151-D7C4-4C3E-8608-61515AFD4BD7}"/>
               </a:ext>
             </a:extLst>
           </p:cNvPr>
@@ -27331,7 +27053,7 @@
       </p:sp>
       <p:sp>
         <p:nvSpPr>
-          <p:cNvPr id="44" name="Oval 124"/>
+          <p:cNvPr id="45" name="Oval 120"/>
           <p:cNvSpPr>
             <a:spLocks noChangeAspect="1"/>
           </p:cNvSpPr>
@@ -27339,7 +27061,131 @@
         </p:nvSpPr>
         <p:spPr>
           <a:xfrm>
-            <a:off x="9013140" y="297930"/>
+            <a:off x="11878494" y="308795"/>
+            <a:ext cx="211404" cy="211689"/>
+          </a:xfrm>
+          <a:prstGeom prst="ellipse">
+            <a:avLst/>
+          </a:prstGeom>
+          <a:solidFill>
+            <a:srgbClr val="00B050"/>
+          </a:solidFill>
+          <a:ln w="12700">
+            <a:solidFill>
+              <a:schemeClr val="accent3"/>
+            </a:solidFill>
+          </a:ln>
+        </p:spPr>
+        <p:style>
+          <a:lnRef idx="2">
+            <a:schemeClr val="accent1">
+              <a:shade val="50000"/>
+            </a:schemeClr>
+          </a:lnRef>
+          <a:fillRef idx="1">
+            <a:schemeClr val="accent1"/>
+          </a:fillRef>
+          <a:effectRef idx="0">
+            <a:schemeClr val="accent1"/>
+          </a:effectRef>
+          <a:fontRef idx="minor">
+            <a:schemeClr val="lt1"/>
+          </a:fontRef>
+        </p:style>
+        <p:txBody>
+          <a:bodyPr wrap="none" lIns="52922" tIns="52922" rIns="52922" rtlCol="0" anchor="ctr"/>
+          <a:lstStyle/>
+          <a:p>
+            <a:pPr algn="ctr" defTabSz="672130"/>
+            <a:endParaRPr lang="en-US" sz="1176" dirty="0">
+              <a:solidFill>
+                <a:prstClr val="black"/>
+              </a:solidFill>
+              <a:latin typeface="Simplon BP Regular"/>
+              <a:cs typeface="Simplon BP Regular"/>
+            </a:endParaRPr>
+          </a:p>
+        </p:txBody>
+      </p:sp>
+      <p:sp>
+        <p:nvSpPr>
+          <p:cNvPr id="5" name="Oval 120">
+            <a:extLst>
+              <a:ext uri="{FF2B5EF4-FFF2-40B4-BE49-F238E27FC236}">
+                <a16:creationId xmlns:a16="http://schemas.microsoft.com/office/drawing/2014/main" id="{12ED55B7-0783-48A5-991A-C640DA4A540A}"/>
+              </a:ext>
+            </a:extLst>
+          </p:cNvPr>
+          <p:cNvSpPr>
+            <a:spLocks noChangeAspect="1"/>
+          </p:cNvSpPr>
+          <p:nvPr/>
+        </p:nvSpPr>
+        <p:spPr>
+          <a:xfrm>
+            <a:off x="9295266" y="304816"/>
+            <a:ext cx="211404" cy="211689"/>
+          </a:xfrm>
+          <a:prstGeom prst="ellipse">
+            <a:avLst/>
+          </a:prstGeom>
+          <a:solidFill>
+            <a:srgbClr val="FFC000"/>
+          </a:solidFill>
+          <a:ln w="12700">
+            <a:solidFill>
+              <a:schemeClr val="accent3"/>
+            </a:solidFill>
+          </a:ln>
+        </p:spPr>
+        <p:style>
+          <a:lnRef idx="2">
+            <a:schemeClr val="accent1">
+              <a:shade val="50000"/>
+            </a:schemeClr>
+          </a:lnRef>
+          <a:fillRef idx="1">
+            <a:schemeClr val="accent1"/>
+          </a:fillRef>
+          <a:effectRef idx="0">
+            <a:schemeClr val="accent1"/>
+          </a:effectRef>
+          <a:fontRef idx="minor">
+            <a:schemeClr val="lt1"/>
+          </a:fontRef>
+        </p:style>
+        <p:txBody>
+          <a:bodyPr wrap="none" lIns="52922" tIns="52922" rIns="52922" rtlCol="0" anchor="ctr"/>
+          <a:lstStyle/>
+          <a:p>
+            <a:pPr algn="ctr" defTabSz="672130"/>
+            <a:endParaRPr lang="en-US" sz="1176" dirty="0">
+              <a:solidFill>
+                <a:prstClr val="black"/>
+              </a:solidFill>
+              <a:latin typeface="Simplon BP Regular"/>
+              <a:cs typeface="Simplon BP Regular"/>
+            </a:endParaRPr>
+          </a:p>
+        </p:txBody>
+      </p:sp>
+      <p:sp>
+        <p:nvSpPr>
+          <p:cNvPr id="6" name="Oval 124">
+            <a:extLst>
+              <a:ext uri="{FF2B5EF4-FFF2-40B4-BE49-F238E27FC236}">
+                <a16:creationId xmlns:a16="http://schemas.microsoft.com/office/drawing/2014/main" id="{998C3F4E-3C6D-4923-9E45-E7B6B6CC8BAE}"/>
+              </a:ext>
+            </a:extLst>
+          </p:cNvPr>
+          <p:cNvSpPr>
+            <a:spLocks noChangeAspect="1"/>
+          </p:cNvSpPr>
+          <p:nvPr/>
+        </p:nvSpPr>
+        <p:spPr>
+          <a:xfrm>
+            <a:off x="10925711" y="297930"/>
             <a:ext cx="211404" cy="211689"/>
           </a:xfrm>
           <a:prstGeom prst="ellipse">
@@ -27387,7 +27233,13 @@
       </p:sp>
       <p:sp>
         <p:nvSpPr>
-          <p:cNvPr id="45" name="Oval 120"/>
+          <p:cNvPr id="9" name="Oval 115">
+            <a:extLst>
+              <a:ext uri="{FF2B5EF4-FFF2-40B4-BE49-F238E27FC236}">
+                <a16:creationId xmlns:a16="http://schemas.microsoft.com/office/drawing/2014/main" id="{1F88FCF3-A604-473B-9A05-D3E6BB8070D6}"/>
+              </a:ext>
+            </a:extLst>
+          </p:cNvPr>
           <p:cNvSpPr>
             <a:spLocks noChangeAspect="1"/>
           </p:cNvSpPr>
@@ -27395,14 +27247,14 @@
         </p:nvSpPr>
         <p:spPr>
           <a:xfrm>
-            <a:off x="12164174" y="309722"/>
+            <a:off x="11193909" y="297930"/>
             <a:ext cx="211404" cy="211689"/>
           </a:xfrm>
           <a:prstGeom prst="ellipse">
             <a:avLst/>
           </a:prstGeom>
           <a:solidFill>
-            <a:srgbClr val="FFC000"/>
+            <a:schemeClr val="bg1"/>
           </a:solidFill>
           <a:ln w="12700">
             <a:solidFill>
@@ -27451,13 +27303,6 @@
   <p:clrMapOvr>
     <a:masterClrMapping/>
   </p:clrMapOvr>
-  <p:timing>
-    <p:tnLst>
-      <p:par>
-        <p:cTn id="1" dur="indefinite" restart="never" nodeType="tmRoot"/>
-      </p:par>
-    </p:tnLst>
-  </p:timing>
 </p:sld>
 </file>
 
@@ -27498,7 +27343,7 @@
           <a:graphicData uri="http://schemas.openxmlformats.org/presentationml/2006/ole">
             <mc:AlternateContent xmlns:mc="http://schemas.openxmlformats.org/markup-compatibility/2006">
               <mc:Choice xmlns:v="urn:schemas-microsoft-com:vml" Requires="v">
-                <p:oleObj spid="_x0000_s2068" name="Slide do think-cell" r:id="rId7" imgW="270" imgH="270" progId="TCLayout.ActiveDocument.1">
+                <p:oleObj spid="_x0000_s2070" name="Slide do think-cell" r:id="rId7" imgW="270" imgH="270" progId="TCLayout.ActiveDocument.1">
                   <p:embed/>
                 </p:oleObj>
               </mc:Choice>
@@ -29425,7 +29270,7 @@
             <a:hlinkClick r:id="" action="ppaction://noaction"/>
             <a:extLst>
               <a:ext uri="{FF2B5EF4-FFF2-40B4-BE49-F238E27FC236}">
-                <a16:creationId xmlns="" xmlns:a16="http://schemas.microsoft.com/office/drawing/2014/main" id="{1F0CBBDC-2315-430E-AEEA-C6591C07E4A2}"/>
+                <a16:creationId xmlns:a16="http://schemas.microsoft.com/office/drawing/2014/main" id="{1F0CBBDC-2315-430E-AEEA-C6591C07E4A2}"/>
               </a:ext>
             </a:extLst>
           </p:cNvPr>
@@ -29471,7 +29316,7 @@
             <a:hlinkClick r:id="" action="ppaction://noaction"/>
             <a:extLst>
               <a:ext uri="{FF2B5EF4-FFF2-40B4-BE49-F238E27FC236}">
-                <a16:creationId xmlns="" xmlns:a16="http://schemas.microsoft.com/office/drawing/2014/main" id="{52DD515D-7F63-4291-A3C3-68035A28B582}"/>
+                <a16:creationId xmlns:a16="http://schemas.microsoft.com/office/drawing/2014/main" id="{52DD515D-7F63-4291-A3C3-68035A28B582}"/>
               </a:ext>
             </a:extLst>
           </p:cNvPr>
@@ -29516,7 +29361,7 @@
           <p:cNvPr id="17" name="Elipse 16">
             <a:extLst>
               <a:ext uri="{FF2B5EF4-FFF2-40B4-BE49-F238E27FC236}">
-                <a16:creationId xmlns="" xmlns:a16="http://schemas.microsoft.com/office/drawing/2014/main" id="{C5380733-6F5D-4194-9AD2-D0B5F3C93AE1}"/>
+                <a16:creationId xmlns:a16="http://schemas.microsoft.com/office/drawing/2014/main" id="{C5380733-6F5D-4194-9AD2-D0B5F3C93AE1}"/>
               </a:ext>
             </a:extLst>
           </p:cNvPr>
@@ -29570,7 +29415,7 @@
           <p:cNvPr id="20" name="CaixaDeTexto 19">
             <a:extLst>
               <a:ext uri="{FF2B5EF4-FFF2-40B4-BE49-F238E27FC236}">
-                <a16:creationId xmlns="" xmlns:a16="http://schemas.microsoft.com/office/drawing/2014/main" id="{48C035DA-C79B-40E7-8C87-ED0980B37601}"/>
+                <a16:creationId xmlns:a16="http://schemas.microsoft.com/office/drawing/2014/main" id="{48C035DA-C79B-40E7-8C87-ED0980B37601}"/>
               </a:ext>
             </a:extLst>
           </p:cNvPr>
@@ -29648,7 +29493,7 @@
           <p:cNvPr id="36" name="Conector reto 35">
             <a:extLst>
               <a:ext uri="{FF2B5EF4-FFF2-40B4-BE49-F238E27FC236}">
-                <a16:creationId xmlns="" xmlns:a16="http://schemas.microsoft.com/office/drawing/2014/main" id="{30B5B7B8-CF33-4805-88BA-E17C33356786}"/>
+                <a16:creationId xmlns:a16="http://schemas.microsoft.com/office/drawing/2014/main" id="{30B5B7B8-CF33-4805-88BA-E17C33356786}"/>
               </a:ext>
             </a:extLst>
           </p:cNvPr>
@@ -29692,7 +29537,7 @@
           <p:cNvPr id="55" name="CaixaDeTexto 54">
             <a:extLst>
               <a:ext uri="{FF2B5EF4-FFF2-40B4-BE49-F238E27FC236}">
-                <a16:creationId xmlns="" xmlns:a16="http://schemas.microsoft.com/office/drawing/2014/main" id="{5C9EC840-FF5E-45B9-A112-87013926B770}"/>
+                <a16:creationId xmlns:a16="http://schemas.microsoft.com/office/drawing/2014/main" id="{5C9EC840-FF5E-45B9-A112-87013926B770}"/>
               </a:ext>
             </a:extLst>
           </p:cNvPr>
@@ -29742,7 +29587,7 @@
           <p:cNvPr id="63" name="Elipse 62">
             <a:extLst>
               <a:ext uri="{FF2B5EF4-FFF2-40B4-BE49-F238E27FC236}">
-                <a16:creationId xmlns="" xmlns:a16="http://schemas.microsoft.com/office/drawing/2014/main" id="{E12AB2F3-8086-4DC1-AA1C-06995EAC28B9}"/>
+                <a16:creationId xmlns:a16="http://schemas.microsoft.com/office/drawing/2014/main" id="{E12AB2F3-8086-4DC1-AA1C-06995EAC28B9}"/>
               </a:ext>
             </a:extLst>
           </p:cNvPr>
@@ -29798,7 +29643,7 @@
           <p:cNvPr id="64" name="Conector angulado 15">
             <a:extLst>
               <a:ext uri="{FF2B5EF4-FFF2-40B4-BE49-F238E27FC236}">
-                <a16:creationId xmlns="" xmlns:a16="http://schemas.microsoft.com/office/drawing/2014/main" id="{F17307C4-DF1B-413B-A553-2F35F9B23221}"/>
+                <a16:creationId xmlns:a16="http://schemas.microsoft.com/office/drawing/2014/main" id="{F17307C4-DF1B-413B-A553-2F35F9B23221}"/>
               </a:ext>
             </a:extLst>
           </p:cNvPr>
@@ -29853,13 +29698,6 @@
     <a:masterClrMapping/>
   </p:clrMapOvr>
   <p:transition/>
-  <p:timing>
-    <p:tnLst>
-      <p:par>
-        <p:cTn id="1" dur="indefinite" restart="never" nodeType="tmRoot"/>
-      </p:par>
-    </p:tnLst>
-  </p:timing>
 </p:sld>
 </file>
 
@@ -29900,7 +29738,7 @@
           <a:graphicData uri="http://schemas.openxmlformats.org/presentationml/2006/ole">
             <mc:AlternateContent xmlns:mc="http://schemas.openxmlformats.org/markup-compatibility/2006">
               <mc:Choice xmlns:v="urn:schemas-microsoft-com:vml" Requires="v">
-                <p:oleObj spid="_x0000_s3092" name="Slide do think-cell" r:id="rId7" imgW="270" imgH="270" progId="TCLayout.ActiveDocument.1">
+                <p:oleObj spid="_x0000_s3094" name="Slide do think-cell" r:id="rId7" imgW="270" imgH="270" progId="TCLayout.ActiveDocument.1">
                   <p:embed/>
                 </p:oleObj>
               </mc:Choice>
@@ -31827,7 +31665,7 @@
             <a:hlinkClick r:id="" action="ppaction://noaction"/>
             <a:extLst>
               <a:ext uri="{FF2B5EF4-FFF2-40B4-BE49-F238E27FC236}">
-                <a16:creationId xmlns="" xmlns:a16="http://schemas.microsoft.com/office/drawing/2014/main" id="{1F0CBBDC-2315-430E-AEEA-C6591C07E4A2}"/>
+                <a16:creationId xmlns:a16="http://schemas.microsoft.com/office/drawing/2014/main" id="{1F0CBBDC-2315-430E-AEEA-C6591C07E4A2}"/>
               </a:ext>
             </a:extLst>
           </p:cNvPr>
@@ -31873,7 +31711,7 @@
             <a:hlinkClick r:id="" action="ppaction://noaction"/>
             <a:extLst>
               <a:ext uri="{FF2B5EF4-FFF2-40B4-BE49-F238E27FC236}">
-                <a16:creationId xmlns="" xmlns:a16="http://schemas.microsoft.com/office/drawing/2014/main" id="{52DD515D-7F63-4291-A3C3-68035A28B582}"/>
+                <a16:creationId xmlns:a16="http://schemas.microsoft.com/office/drawing/2014/main" id="{52DD515D-7F63-4291-A3C3-68035A28B582}"/>
               </a:ext>
             </a:extLst>
           </p:cNvPr>
@@ -31918,7 +31756,7 @@
           <p:cNvPr id="17" name="Elipse 16">
             <a:extLst>
               <a:ext uri="{FF2B5EF4-FFF2-40B4-BE49-F238E27FC236}">
-                <a16:creationId xmlns="" xmlns:a16="http://schemas.microsoft.com/office/drawing/2014/main" id="{C5380733-6F5D-4194-9AD2-D0B5F3C93AE1}"/>
+                <a16:creationId xmlns:a16="http://schemas.microsoft.com/office/drawing/2014/main" id="{C5380733-6F5D-4194-9AD2-D0B5F3C93AE1}"/>
               </a:ext>
             </a:extLst>
           </p:cNvPr>
@@ -31972,7 +31810,7 @@
           <p:cNvPr id="20" name="CaixaDeTexto 19">
             <a:extLst>
               <a:ext uri="{FF2B5EF4-FFF2-40B4-BE49-F238E27FC236}">
-                <a16:creationId xmlns="" xmlns:a16="http://schemas.microsoft.com/office/drawing/2014/main" id="{48C035DA-C79B-40E7-8C87-ED0980B37601}"/>
+                <a16:creationId xmlns:a16="http://schemas.microsoft.com/office/drawing/2014/main" id="{48C035DA-C79B-40E7-8C87-ED0980B37601}"/>
               </a:ext>
             </a:extLst>
           </p:cNvPr>
@@ -32041,7 +31879,7 @@
           <p:cNvPr id="36" name="Conector reto 35">
             <a:extLst>
               <a:ext uri="{FF2B5EF4-FFF2-40B4-BE49-F238E27FC236}">
-                <a16:creationId xmlns="" xmlns:a16="http://schemas.microsoft.com/office/drawing/2014/main" id="{30B5B7B8-CF33-4805-88BA-E17C33356786}"/>
+                <a16:creationId xmlns:a16="http://schemas.microsoft.com/office/drawing/2014/main" id="{30B5B7B8-CF33-4805-88BA-E17C33356786}"/>
               </a:ext>
             </a:extLst>
           </p:cNvPr>
@@ -32085,7 +31923,7 @@
           <p:cNvPr id="55" name="CaixaDeTexto 54">
             <a:extLst>
               <a:ext uri="{FF2B5EF4-FFF2-40B4-BE49-F238E27FC236}">
-                <a16:creationId xmlns="" xmlns:a16="http://schemas.microsoft.com/office/drawing/2014/main" id="{5C9EC840-FF5E-45B9-A112-87013926B770}"/>
+                <a16:creationId xmlns:a16="http://schemas.microsoft.com/office/drawing/2014/main" id="{5C9EC840-FF5E-45B9-A112-87013926B770}"/>
               </a:ext>
             </a:extLst>
           </p:cNvPr>
@@ -32135,7 +31973,7 @@
           <p:cNvPr id="63" name="Elipse 62">
             <a:extLst>
               <a:ext uri="{FF2B5EF4-FFF2-40B4-BE49-F238E27FC236}">
-                <a16:creationId xmlns="" xmlns:a16="http://schemas.microsoft.com/office/drawing/2014/main" id="{E12AB2F3-8086-4DC1-AA1C-06995EAC28B9}"/>
+                <a16:creationId xmlns:a16="http://schemas.microsoft.com/office/drawing/2014/main" id="{E12AB2F3-8086-4DC1-AA1C-06995EAC28B9}"/>
               </a:ext>
             </a:extLst>
           </p:cNvPr>
@@ -32191,7 +32029,7 @@
           <p:cNvPr id="64" name="Conector angulado 15">
             <a:extLst>
               <a:ext uri="{FF2B5EF4-FFF2-40B4-BE49-F238E27FC236}">
-                <a16:creationId xmlns="" xmlns:a16="http://schemas.microsoft.com/office/drawing/2014/main" id="{F17307C4-DF1B-413B-A553-2F35F9B23221}"/>
+                <a16:creationId xmlns:a16="http://schemas.microsoft.com/office/drawing/2014/main" id="{F17307C4-DF1B-413B-A553-2F35F9B23221}"/>
               </a:ext>
             </a:extLst>
           </p:cNvPr>
@@ -34116,7 +33954,7 @@
           <p:cNvPr id="2" name="AutoShape 54">
             <a:extLst>
               <a:ext uri="{FF2B5EF4-FFF2-40B4-BE49-F238E27FC236}">
-                <a16:creationId xmlns="" xmlns:a16="http://schemas.microsoft.com/office/drawing/2014/main" id="{E9E56096-A37E-4E04-B585-F38CE69E2C4D}"/>
+                <a16:creationId xmlns:a16="http://schemas.microsoft.com/office/drawing/2014/main" id="{E9E56096-A37E-4E04-B585-F38CE69E2C4D}"/>
               </a:ext>
             </a:extLst>
           </p:cNvPr>
@@ -34189,7 +34027,7 @@
           <p:cNvPr id="3" name="Estrela de 5 Pontas 6">
             <a:extLst>
               <a:ext uri="{FF2B5EF4-FFF2-40B4-BE49-F238E27FC236}">
-                <a16:creationId xmlns="" xmlns:a16="http://schemas.microsoft.com/office/drawing/2014/main" id="{AD16236F-7568-4F98-A604-6EC65AD0D66C}"/>
+                <a16:creationId xmlns:a16="http://schemas.microsoft.com/office/drawing/2014/main" id="{AD16236F-7568-4F98-A604-6EC65AD0D66C}"/>
               </a:ext>
             </a:extLst>
           </p:cNvPr>
@@ -34236,7 +34074,7 @@
           <p:cNvPr id="5" name="Texto Explicativo Retangular 7">
             <a:extLst>
               <a:ext uri="{FF2B5EF4-FFF2-40B4-BE49-F238E27FC236}">
-                <a16:creationId xmlns="" xmlns:a16="http://schemas.microsoft.com/office/drawing/2014/main" id="{A7519FE8-CE66-44F1-85D2-72BA40AEFFE9}"/>
+                <a16:creationId xmlns:a16="http://schemas.microsoft.com/office/drawing/2014/main" id="{A7519FE8-CE66-44F1-85D2-72BA40AEFFE9}"/>
               </a:ext>
             </a:extLst>
           </p:cNvPr>
@@ -34309,7 +34147,7 @@
           <p:cNvPr id="10" name="CaixaDeTexto 9">
             <a:extLst>
               <a:ext uri="{FF2B5EF4-FFF2-40B4-BE49-F238E27FC236}">
-                <a16:creationId xmlns="" xmlns:a16="http://schemas.microsoft.com/office/drawing/2014/main" id="{DF44FE3B-8CD1-4551-B052-AB416A48BF0F}"/>
+                <a16:creationId xmlns:a16="http://schemas.microsoft.com/office/drawing/2014/main" id="{DF44FE3B-8CD1-4551-B052-AB416A48BF0F}"/>
               </a:ext>
             </a:extLst>
           </p:cNvPr>
@@ -34345,7 +34183,7 @@
           <p:cNvPr id="11" name="CaixaDeTexto 10">
             <a:extLst>
               <a:ext uri="{FF2B5EF4-FFF2-40B4-BE49-F238E27FC236}">
-                <a16:creationId xmlns="" xmlns:a16="http://schemas.microsoft.com/office/drawing/2014/main" id="{11EF466B-D50F-49BE-8901-F4314447EC7A}"/>
+                <a16:creationId xmlns:a16="http://schemas.microsoft.com/office/drawing/2014/main" id="{11EF466B-D50F-49BE-8901-F4314447EC7A}"/>
               </a:ext>
             </a:extLst>
           </p:cNvPr>
@@ -34381,7 +34219,7 @@
           <p:cNvPr id="12" name="CaixaDeTexto 11">
             <a:extLst>
               <a:ext uri="{FF2B5EF4-FFF2-40B4-BE49-F238E27FC236}">
-                <a16:creationId xmlns="" xmlns:a16="http://schemas.microsoft.com/office/drawing/2014/main" id="{11F63061-82C5-4CBE-AF39-7668F95413AC}"/>
+                <a16:creationId xmlns:a16="http://schemas.microsoft.com/office/drawing/2014/main" id="{11F63061-82C5-4CBE-AF39-7668F95413AC}"/>
               </a:ext>
             </a:extLst>
           </p:cNvPr>
@@ -34417,7 +34255,7 @@
           <p:cNvPr id="13" name="Estrela de 5 Pontas 6">
             <a:extLst>
               <a:ext uri="{FF2B5EF4-FFF2-40B4-BE49-F238E27FC236}">
-                <a16:creationId xmlns="" xmlns:a16="http://schemas.microsoft.com/office/drawing/2014/main" id="{AD22261C-D7D8-4F88-A384-FA0A3A6B653B}"/>
+                <a16:creationId xmlns:a16="http://schemas.microsoft.com/office/drawing/2014/main" id="{AD22261C-D7D8-4F88-A384-FA0A3A6B653B}"/>
               </a:ext>
             </a:extLst>
           </p:cNvPr>
@@ -34464,7 +34302,7 @@
           <p:cNvPr id="14" name="AutoShape 54">
             <a:extLst>
               <a:ext uri="{FF2B5EF4-FFF2-40B4-BE49-F238E27FC236}">
-                <a16:creationId xmlns="" xmlns:a16="http://schemas.microsoft.com/office/drawing/2014/main" id="{50F5334B-AE01-42AE-9885-3F4B46D4DC77}"/>
+                <a16:creationId xmlns:a16="http://schemas.microsoft.com/office/drawing/2014/main" id="{50F5334B-AE01-42AE-9885-3F4B46D4DC77}"/>
               </a:ext>
             </a:extLst>
           </p:cNvPr>
@@ -34604,7 +34442,7 @@
           <p:cNvPr id="3" name="Imagem 2">
             <a:extLst>
               <a:ext uri="{FF2B5EF4-FFF2-40B4-BE49-F238E27FC236}">
-                <a16:creationId xmlns="" xmlns:a16="http://schemas.microsoft.com/office/drawing/2014/main" id="{429E1994-3E55-4E42-8049-0E4CEA68092C}"/>
+                <a16:creationId xmlns:a16="http://schemas.microsoft.com/office/drawing/2014/main" id="{429E1994-3E55-4E42-8049-0E4CEA68092C}"/>
               </a:ext>
             </a:extLst>
           </p:cNvPr>
@@ -34634,7 +34472,7 @@
           <p:cNvPr id="4" name="Retângulo 3">
             <a:extLst>
               <a:ext uri="{FF2B5EF4-FFF2-40B4-BE49-F238E27FC236}">
-                <a16:creationId xmlns="" xmlns:a16="http://schemas.microsoft.com/office/drawing/2014/main" id="{2EC4C4E3-DDB0-406B-A82F-A1D1FF8FD7E3}"/>
+                <a16:creationId xmlns:a16="http://schemas.microsoft.com/office/drawing/2014/main" id="{2EC4C4E3-DDB0-406B-A82F-A1D1FF8FD7E3}"/>
               </a:ext>
             </a:extLst>
           </p:cNvPr>
@@ -34714,14 +34552,6 @@
   <p:clrMapOvr>
     <a:masterClrMapping/>
   </p:clrMapOvr>
-  <mc:AlternateContent xmlns:mc="http://schemas.openxmlformats.org/markup-compatibility/2006" xmlns:p14="http://schemas.microsoft.com/office/powerpoint/2010/main">
-    <mc:Choice Requires="p14">
-      <p:transition spd="slow" p14:dur="2000"/>
-    </mc:Choice>
-    <mc:Fallback xmlns="">
-      <p:transition spd="slow"/>
-    </mc:Fallback>
-  </mc:AlternateContent>
 </p:sld>
 </file>
 
@@ -34793,7 +34623,7 @@
           <p:cNvPr id="3" name="Imagem 2">
             <a:extLst>
               <a:ext uri="{FF2B5EF4-FFF2-40B4-BE49-F238E27FC236}">
-                <a16:creationId xmlns="" xmlns:a16="http://schemas.microsoft.com/office/drawing/2014/main" id="{429E1994-3E55-4E42-8049-0E4CEA68092C}"/>
+                <a16:creationId xmlns:a16="http://schemas.microsoft.com/office/drawing/2014/main" id="{429E1994-3E55-4E42-8049-0E4CEA68092C}"/>
               </a:ext>
             </a:extLst>
           </p:cNvPr>
@@ -34823,7 +34653,7 @@
           <p:cNvPr id="4" name="Retângulo 3">
             <a:extLst>
               <a:ext uri="{FF2B5EF4-FFF2-40B4-BE49-F238E27FC236}">
-                <a16:creationId xmlns="" xmlns:a16="http://schemas.microsoft.com/office/drawing/2014/main" id="{2EC4C4E3-DDB0-406B-A82F-A1D1FF8FD7E3}"/>
+                <a16:creationId xmlns:a16="http://schemas.microsoft.com/office/drawing/2014/main" id="{2EC4C4E3-DDB0-406B-A82F-A1D1FF8FD7E3}"/>
               </a:ext>
             </a:extLst>
           </p:cNvPr>
@@ -34903,14 +34733,6 @@
   <p:clrMapOvr>
     <a:masterClrMapping/>
   </p:clrMapOvr>
-  <mc:AlternateContent xmlns:mc="http://schemas.openxmlformats.org/markup-compatibility/2006" xmlns:p14="http://schemas.microsoft.com/office/powerpoint/2010/main">
-    <mc:Choice Requires="p14">
-      <p:transition spd="slow" p14:dur="2000"/>
-    </mc:Choice>
-    <mc:Fallback xmlns="">
-      <p:transition spd="slow"/>
-    </mc:Fallback>
-  </mc:AlternateContent>
 </p:sld>
 </file>
 
@@ -36491,15 +36313,6 @@
 </file>
 
 <file path=customXml/item2.xml><?xml version="1.0" encoding="utf-8"?>
-<?mso-contentType ?>
-<FormTemplates xmlns="http://schemas.microsoft.com/sharepoint/v3/contenttype/forms">
-  <Display>DocumentLibraryForm</Display>
-  <Edit>DocumentLibraryForm</Edit>
-  <New>DocumentLibraryForm</New>
-</FormTemplates>
-</file>
-
-<file path=customXml/item3.xml><?xml version="1.0" encoding="utf-8"?>
 <ct:contentTypeSchema xmlns:ct="http://schemas.microsoft.com/office/2006/metadata/contentType" xmlns:ma="http://schemas.microsoft.com/office/2006/metadata/properties/metaAttributes" ct:_="" ma:_="" ma:contentTypeName="Document" ma:contentTypeID="0x0101001132905C37EA9847A7207C4BBCCCD8F4" ma:contentTypeVersion="34" ma:contentTypeDescription="Create a new document." ma:contentTypeScope="" ma:versionID="2f28daba72ca6e92be87ea70ebe5bb94">
   <xsd:schema xmlns:xsd="http://www.w3.org/2001/XMLSchema" xmlns:xs="http://www.w3.org/2001/XMLSchema" xmlns:p="http://schemas.microsoft.com/office/2006/metadata/properties" xmlns:ns3="4327b14a-fe89-488e-9f6d-9658cacf372b" xmlns:ns4="bbcd8c33-6940-4d4c-a587-bbc736ca1e4d" targetNamespace="http://schemas.microsoft.com/office/2006/metadata/properties" ma:root="true" ma:fieldsID="df18e839ce2650f1975b41376e6cdb6b" ns3:_="" ns4:_="">
     <xsd:import namespace="4327b14a-fe89-488e-9f6d-9658cacf372b"/>
@@ -36916,6 +36729,15 @@
 </ct:contentTypeSchema>
 </file>
 
+<file path=customXml/item3.xml><?xml version="1.0" encoding="utf-8"?>
+<?mso-contentType ?>
+<FormTemplates xmlns="http://schemas.microsoft.com/sharepoint/v3/contenttype/forms">
+  <Display>DocumentLibraryForm</Display>
+  <Edit>DocumentLibraryForm</Edit>
+  <New>DocumentLibraryForm</New>
+</FormTemplates>
+</file>
+
 <file path=customXml/itemProps1.xml><?xml version="1.0" encoding="utf-8"?>
 <ds:datastoreItem xmlns:ds="http://schemas.openxmlformats.org/officeDocument/2006/customXml" ds:itemID="{4B31267F-D399-4A8A-87F8-B75F56828412}">
   <ds:schemaRefs>
@@ -36934,14 +36756,6 @@
 </file>
 
 <file path=customXml/itemProps2.xml><?xml version="1.0" encoding="utf-8"?>
-<ds:datastoreItem xmlns:ds="http://schemas.openxmlformats.org/officeDocument/2006/customXml" ds:itemID="{E2481852-F24E-4532-AF30-C154D705D105}">
-  <ds:schemaRefs>
-    <ds:schemaRef ds:uri="http://schemas.microsoft.com/sharepoint/v3/contenttype/forms"/>
-  </ds:schemaRefs>
-</ds:datastoreItem>
-</file>
-
-<file path=customXml/itemProps3.xml><?xml version="1.0" encoding="utf-8"?>
 <ds:datastoreItem xmlns:ds="http://schemas.openxmlformats.org/officeDocument/2006/customXml" ds:itemID="{3BE6CAF6-1F55-4A70-B10C-21633F74987A}">
   <ds:schemaRefs>
     <ds:schemaRef ds:uri="http://schemas.microsoft.com/office/2006/metadata/contentType"/>
@@ -36958,4 +36772,12 @@
     <ds:schemaRef ds:uri="http://schemas.microsoft.com/internal/obd"/>
   </ds:schemaRefs>
 </ds:datastoreItem>
+</file>
+
+<file path=customXml/itemProps3.xml><?xml version="1.0" encoding="utf-8"?>
+<ds:datastoreItem xmlns:ds="http://schemas.openxmlformats.org/officeDocument/2006/customXml" ds:itemID="{E2481852-F24E-4532-AF30-C154D705D105}">
+  <ds:schemaRefs>
+    <ds:schemaRef ds:uri="http://schemas.microsoft.com/sharepoint/v3/contenttype/forms"/>
+  </ds:schemaRefs>
+</ds:datastoreItem>
 </file>
</xml_diff>